<commit_message>
Presenter Review of Slides
</commit_message>
<xml_diff>
--- a/PPTs/01_iac_bigger_picture.pptx
+++ b/PPTs/01_iac_bigger_picture.pptx
@@ -21594,7 +21594,7 @@
               <a:rPr lang="en-US" smtClean="0">
                 <a:latin typeface="Segoe UI" pitchFamily="34" charset="0"/>
               </a:rPr>
-              <a:t>6/29/2023 12:11 PM</a:t>
+              <a:t>7/31/2023 9:28 AM</a:t>
             </a:fld>
             <a:endParaRPr lang="en-US" dirty="0">
               <a:latin typeface="Segoe UI" pitchFamily="34" charset="0"/>
@@ -21872,7 +21872,7 @@
           <a:p>
             <a:fld id="{386CE63F-9E7F-4C04-9D0D-FCA25A8E9E86}" type="datetime8">
               <a:rPr lang="en-US" smtClean="0"/>
-              <a:t>6/29/2023 12:10 PM</a:t>
+              <a:t>7/31/2023 9:27 AM</a:t>
             </a:fld>
             <a:endParaRPr lang="en-US" dirty="0"/>
           </a:p>
@@ -22239,7 +22239,7 @@
           <a:p>
             <a:fld id="{321E5A7B-BB8D-4368-A182-109669521632}" type="datetime8">
               <a:rPr lang="en-US" smtClean="0"/>
-              <a:t>6/29/2023 12:10 PM</a:t>
+              <a:t>7/31/2023 9:27 AM</a:t>
             </a:fld>
             <a:endParaRPr lang="en-US" dirty="0"/>
           </a:p>
@@ -22404,7 +22404,7 @@
           <a:p>
             <a:fld id="{E2F19A73-88F5-4B80-A929-CF8E66EE5449}" type="datetime8">
               <a:rPr lang="en-US" smtClean="0"/>
-              <a:t>6/29/2023 12:10 PM</a:t>
+              <a:t>7/31/2023 9:27 AM</a:t>
             </a:fld>
             <a:endParaRPr lang="en-US" dirty="0"/>
           </a:p>
@@ -22823,7 +22823,7 @@
           <a:p>
             <a:fld id="{386CE63F-9E7F-4C04-9D0D-FCA25A8E9E86}" type="datetime8">
               <a:rPr lang="en-US" smtClean="0"/>
-              <a:t>6/29/2023 12:10 PM</a:t>
+              <a:t>7/31/2023 9:27 AM</a:t>
             </a:fld>
             <a:endParaRPr lang="en-US" dirty="0"/>
           </a:p>
@@ -23048,7 +23048,7 @@
           <a:p>
             <a:fld id="{386CE63F-9E7F-4C04-9D0D-FCA25A8E9E86}" type="datetime8">
               <a:rPr lang="en-US" smtClean="0"/>
-              <a:t>6/29/2023 12:11 PM</a:t>
+              <a:t>7/31/2023 9:27 AM</a:t>
             </a:fld>
             <a:endParaRPr lang="en-US" dirty="0"/>
           </a:p>
@@ -23213,7 +23213,7 @@
           <a:p>
             <a:fld id="{9427A7F7-BB1E-479D-AFAA-B52F4D0C99F2}" type="datetime8">
               <a:rPr lang="en-US" smtClean="0"/>
-              <a:t>6/29/2023 12:10 PM</a:t>
+              <a:t>7/31/2023 9:27 AM</a:t>
             </a:fld>
             <a:endParaRPr lang="en-US" dirty="0"/>
           </a:p>
@@ -23363,7 +23363,7 @@
                   <a:prstClr val="black"/>
                 </a:solidFill>
               </a:rPr>
-              <a:t>6/29/2023 12:10 PM</a:t>
+              <a:t>7/31/2023 9:27 AM</a:t>
             </a:fld>
             <a:endParaRPr lang="en-US" dirty="0">
               <a:solidFill>
@@ -23563,7 +23563,7 @@
                   <a:prstClr val="black"/>
                 </a:solidFill>
               </a:rPr>
-              <a:t>6/29/2023 12:10 PM</a:t>
+              <a:t>7/31/2023 9:27 AM</a:t>
             </a:fld>
             <a:endParaRPr lang="en-US" dirty="0">
               <a:solidFill>
@@ -23797,7 +23797,7 @@
           <a:p>
             <a:fld id="{386CE63F-9E7F-4C04-9D0D-FCA25A8E9E86}" type="datetime8">
               <a:rPr lang="en-US" smtClean="0"/>
-              <a:t>6/29/2023 12:10 PM</a:t>
+              <a:t>7/31/2023 9:27 AM</a:t>
             </a:fld>
             <a:endParaRPr lang="en-US" dirty="0"/>
           </a:p>
@@ -24021,7 +24021,7 @@
           <a:p>
             <a:fld id="{9427A7F7-BB1E-479D-AFAA-B52F4D0C99F2}" type="datetime8">
               <a:rPr lang="en-US" smtClean="0"/>
-              <a:t>6/29/2023 12:10 PM</a:t>
+              <a:t>7/31/2023 9:27 AM</a:t>
             </a:fld>
             <a:endParaRPr lang="en-US" dirty="0"/>
           </a:p>
@@ -24202,7 +24202,7 @@
           <a:p>
             <a:fld id="{386CE63F-9E7F-4C04-9D0D-FCA25A8E9E86}" type="datetime8">
               <a:rPr lang="en-US" smtClean="0"/>
-              <a:t>6/29/2023 12:10 PM</a:t>
+              <a:t>7/31/2023 9:27 AM</a:t>
             </a:fld>
             <a:endParaRPr lang="en-US" dirty="0"/>
           </a:p>
@@ -24469,7 +24469,7 @@
           <a:p>
             <a:fld id="{386CE63F-9E7F-4C04-9D0D-FCA25A8E9E86}" type="datetime8">
               <a:rPr lang="en-US" smtClean="0"/>
-              <a:t>6/29/2023 12:10 PM</a:t>
+              <a:t>7/31/2023 9:27 AM</a:t>
             </a:fld>
             <a:endParaRPr lang="en-US" dirty="0"/>
           </a:p>
@@ -24862,7 +24862,7 @@
           <a:p>
             <a:fld id="{386CE63F-9E7F-4C04-9D0D-FCA25A8E9E86}" type="datetime8">
               <a:rPr lang="en-US" smtClean="0"/>
-              <a:t>6/29/2023 12:10 PM</a:t>
+              <a:t>7/31/2023 9:27 AM</a:t>
             </a:fld>
             <a:endParaRPr lang="en-US" dirty="0"/>
           </a:p>
@@ -25043,7 +25043,7 @@
           <a:p>
             <a:fld id="{386CE63F-9E7F-4C04-9D0D-FCA25A8E9E86}" type="datetime8">
               <a:rPr lang="en-US" smtClean="0"/>
-              <a:t>6/29/2023 12:10 PM</a:t>
+              <a:t>7/31/2023 9:27 AM</a:t>
             </a:fld>
             <a:endParaRPr lang="en-US" dirty="0"/>
           </a:p>
@@ -25227,7 +25227,7 @@
           <a:p>
             <a:fld id="{386CE63F-9E7F-4C04-9D0D-FCA25A8E9E86}" type="datetime8">
               <a:rPr lang="en-US" smtClean="0"/>
-              <a:t>6/29/2023 12:10 PM</a:t>
+              <a:t>7/31/2023 9:27 AM</a:t>
             </a:fld>
             <a:endParaRPr lang="en-US" dirty="0"/>
           </a:p>
@@ -25457,7 +25457,7 @@
           <a:p>
             <a:fld id="{386CE63F-9E7F-4C04-9D0D-FCA25A8E9E86}" type="datetime8">
               <a:rPr lang="en-US" smtClean="0"/>
-              <a:t>6/29/2023 12:10 PM</a:t>
+              <a:t>7/31/2023 9:27 AM</a:t>
             </a:fld>
             <a:endParaRPr lang="en-US" dirty="0"/>
           </a:p>
@@ -35141,7 +35141,10 @@
           <a:bodyPr/>
           <a:lstStyle/>
           <a:p>
-            <a:endParaRPr lang="en-US" dirty="0"/>
+            <a:r>
+              <a:rPr lang="en-US" dirty="0"/>
+              <a:t>Ryan Russell-Yates</a:t>
+            </a:r>
           </a:p>
         </p:txBody>
       </p:sp>
@@ -41399,15 +41402,6 @@
 </file>
 
 <file path=customXml/item1.xml><?xml version="1.0" encoding="utf-8"?>
-<?mso-contentType ?>
-<FormTemplates xmlns="http://schemas.microsoft.com/sharepoint/v3/contenttype/forms">
-  <Display>DocumentLibraryForm</Display>
-  <Edit>DocumentLibraryForm</Edit>
-  <New>DocumentLibraryForm</New>
-</FormTemplates>
-</file>
-
-<file path=customXml/item2.xml><?xml version="1.0" encoding="utf-8"?>
 <ct:contentTypeSchema xmlns:ct="http://schemas.microsoft.com/office/2006/metadata/contentType" xmlns:ma="http://schemas.microsoft.com/office/2006/metadata/properties/metaAttributes" ct:_="" ma:_="" ma:contentTypeName="Document" ma:contentTypeID="0x010100581AC3C96BC25B49BAADFDD2709736A2" ma:contentTypeVersion="13" ma:contentTypeDescription="Create a new document." ma:contentTypeScope="" ma:versionID="46d05e5ad3e10e23d0d91d2c812a342c">
   <xsd:schema xmlns:xsd="http://www.w3.org/2001/XMLSchema" xmlns:xs="http://www.w3.org/2001/XMLSchema" xmlns:p="http://schemas.microsoft.com/office/2006/metadata/properties" xmlns:ns3="61d4b2b7-c11c-4679-a498-c69870ddf3ad" xmlns:ns4="53207a91-4873-4278-88cd-3a5c1985bff7" targetNamespace="http://schemas.microsoft.com/office/2006/metadata/properties" ma:root="true" ma:fieldsID="23414a13395756fa7b20173620af81aa" ns3:_="" ns4:_="">
     <xsd:import namespace="61d4b2b7-c11c-4679-a498-c69870ddf3ad"/>
@@ -41630,6 +41624,15 @@
 </ct:contentTypeSchema>
 </file>
 
+<file path=customXml/item2.xml><?xml version="1.0" encoding="utf-8"?>
+<?mso-contentType ?>
+<FormTemplates xmlns="http://schemas.microsoft.com/sharepoint/v3/contenttype/forms">
+  <Display>DocumentLibraryForm</Display>
+  <Edit>DocumentLibraryForm</Edit>
+  <New>DocumentLibraryForm</New>
+</FormTemplates>
+</file>
+
 <file path=customXml/item3.xml><?xml version="1.0" encoding="utf-8"?>
 <p:properties xmlns:p="http://schemas.microsoft.com/office/2006/metadata/properties" xmlns:pc="http://schemas.microsoft.com/office/infopath/2007/PartnerControls" xmlns:xsi="http://www.w3.org/2001/XMLSchema-instance">
   <documentManagement>
@@ -41646,14 +41649,6 @@
 </file>
 
 <file path=customXml/itemProps1.xml><?xml version="1.0" encoding="utf-8"?>
-<ds:datastoreItem xmlns:ds="http://schemas.openxmlformats.org/officeDocument/2006/customXml" ds:itemID="{758FDAC0-319D-4A54-8D8E-1D42CB1F8004}">
-  <ds:schemaRefs>
-    <ds:schemaRef ds:uri="http://schemas.microsoft.com/sharepoint/v3/contenttype/forms"/>
-  </ds:schemaRefs>
-</ds:datastoreItem>
-</file>
-
-<file path=customXml/itemProps2.xml><?xml version="1.0" encoding="utf-8"?>
 <ds:datastoreItem xmlns:ds="http://schemas.openxmlformats.org/officeDocument/2006/customXml" ds:itemID="{405A328C-4840-403E-8B77-0F15BF1E39AC}">
   <ds:schemaRefs>
     <ds:schemaRef ds:uri="http://schemas.microsoft.com/office/2006/metadata/contentType"/>
@@ -41668,6 +41663,14 @@
     <ds:schemaRef ds:uri="http://purl.org/dc/elements/1.1/"/>
     <ds:schemaRef ds:uri="http://purl.org/dc/terms/"/>
     <ds:schemaRef ds:uri="http://schemas.microsoft.com/internal/obd"/>
+  </ds:schemaRefs>
+</ds:datastoreItem>
+</file>
+
+<file path=customXml/itemProps2.xml><?xml version="1.0" encoding="utf-8"?>
+<ds:datastoreItem xmlns:ds="http://schemas.openxmlformats.org/officeDocument/2006/customXml" ds:itemID="{758FDAC0-319D-4A54-8D8E-1D42CB1F8004}">
+  <ds:schemaRefs>
+    <ds:schemaRef ds:uri="http://schemas.microsoft.com/sharepoint/v3/contenttype/forms"/>
   </ds:schemaRefs>
 </ds:datastoreItem>
 </file>

</xml_diff>